<commit_message>
Document the diffusion process in readme
</commit_message>
<xml_diff>
--- a/Images/transformer.pptx
+++ b/Images/transformer.pptx
@@ -14,6 +14,7 @@
     <p:sldId id="257" r:id="rId8"/>
     <p:sldId id="259" r:id="rId9"/>
     <p:sldId id="264" r:id="rId10"/>
+    <p:sldId id="265" r:id="rId11"/>
   </p:sldIdLst>
   <p:sldSz cx="9144000" cy="6858000" type="screen4x3"/>
   <p:notesSz cx="6858000" cy="9144000"/>
@@ -297,7 +298,7 @@
             <a:fld id="{97603EF8-60AF-4BB2-817A-95FF1F8E35CB}" type="datetimeFigureOut">
               <a:rPr lang="sv-SE" smtClean="0"/>
               <a:pPr/>
-              <a:t>2026-01-26</a:t>
+              <a:t>2026-01-28</a:t>
             </a:fld>
             <a:endParaRPr lang="sv-SE" dirty="0"/>
           </a:p>
@@ -464,7 +465,7 @@
             <a:fld id="{97603EF8-60AF-4BB2-817A-95FF1F8E35CB}" type="datetimeFigureOut">
               <a:rPr lang="sv-SE" smtClean="0"/>
               <a:pPr/>
-              <a:t>2026-01-26</a:t>
+              <a:t>2026-01-28</a:t>
             </a:fld>
             <a:endParaRPr lang="sv-SE" dirty="0"/>
           </a:p>
@@ -641,7 +642,7 @@
             <a:fld id="{97603EF8-60AF-4BB2-817A-95FF1F8E35CB}" type="datetimeFigureOut">
               <a:rPr lang="sv-SE" smtClean="0"/>
               <a:pPr/>
-              <a:t>2026-01-26</a:t>
+              <a:t>2026-01-28</a:t>
             </a:fld>
             <a:endParaRPr lang="sv-SE" dirty="0"/>
           </a:p>
@@ -808,7 +809,7 @@
             <a:fld id="{97603EF8-60AF-4BB2-817A-95FF1F8E35CB}" type="datetimeFigureOut">
               <a:rPr lang="sv-SE" smtClean="0"/>
               <a:pPr/>
-              <a:t>2026-01-26</a:t>
+              <a:t>2026-01-28</a:t>
             </a:fld>
             <a:endParaRPr lang="sv-SE" dirty="0"/>
           </a:p>
@@ -1051,7 +1052,7 @@
             <a:fld id="{97603EF8-60AF-4BB2-817A-95FF1F8E35CB}" type="datetimeFigureOut">
               <a:rPr lang="sv-SE" smtClean="0"/>
               <a:pPr/>
-              <a:t>2026-01-26</a:t>
+              <a:t>2026-01-28</a:t>
             </a:fld>
             <a:endParaRPr lang="sv-SE" dirty="0"/>
           </a:p>
@@ -1336,7 +1337,7 @@
             <a:fld id="{97603EF8-60AF-4BB2-817A-95FF1F8E35CB}" type="datetimeFigureOut">
               <a:rPr lang="sv-SE" smtClean="0"/>
               <a:pPr/>
-              <a:t>2026-01-26</a:t>
+              <a:t>2026-01-28</a:t>
             </a:fld>
             <a:endParaRPr lang="sv-SE" dirty="0"/>
           </a:p>
@@ -1755,7 +1756,7 @@
             <a:fld id="{97603EF8-60AF-4BB2-817A-95FF1F8E35CB}" type="datetimeFigureOut">
               <a:rPr lang="sv-SE" smtClean="0"/>
               <a:pPr/>
-              <a:t>2026-01-26</a:t>
+              <a:t>2026-01-28</a:t>
             </a:fld>
             <a:endParaRPr lang="sv-SE" dirty="0"/>
           </a:p>
@@ -1870,7 +1871,7 @@
             <a:fld id="{97603EF8-60AF-4BB2-817A-95FF1F8E35CB}" type="datetimeFigureOut">
               <a:rPr lang="sv-SE" smtClean="0"/>
               <a:pPr/>
-              <a:t>2026-01-26</a:t>
+              <a:t>2026-01-28</a:t>
             </a:fld>
             <a:endParaRPr lang="sv-SE" dirty="0"/>
           </a:p>
@@ -1962,7 +1963,7 @@
             <a:fld id="{97603EF8-60AF-4BB2-817A-95FF1F8E35CB}" type="datetimeFigureOut">
               <a:rPr lang="sv-SE" smtClean="0"/>
               <a:pPr/>
-              <a:t>2026-01-26</a:t>
+              <a:t>2026-01-28</a:t>
             </a:fld>
             <a:endParaRPr lang="sv-SE" dirty="0"/>
           </a:p>
@@ -2236,7 +2237,7 @@
             <a:fld id="{97603EF8-60AF-4BB2-817A-95FF1F8E35CB}" type="datetimeFigureOut">
               <a:rPr lang="sv-SE" smtClean="0"/>
               <a:pPr/>
-              <a:t>2026-01-26</a:t>
+              <a:t>2026-01-28</a:t>
             </a:fld>
             <a:endParaRPr lang="sv-SE" dirty="0"/>
           </a:p>
@@ -2486,7 +2487,7 @@
             <a:fld id="{97603EF8-60AF-4BB2-817A-95FF1F8E35CB}" type="datetimeFigureOut">
               <a:rPr lang="sv-SE" smtClean="0"/>
               <a:pPr/>
-              <a:t>2026-01-26</a:t>
+              <a:t>2026-01-28</a:t>
             </a:fld>
             <a:endParaRPr lang="sv-SE" dirty="0"/>
           </a:p>
@@ -2696,7 +2697,7 @@
             <a:fld id="{97603EF8-60AF-4BB2-817A-95FF1F8E35CB}" type="datetimeFigureOut">
               <a:rPr lang="sv-SE" smtClean="0"/>
               <a:pPr/>
-              <a:t>2026-01-26</a:t>
+              <a:t>2026-01-28</a:t>
             </a:fld>
             <a:endParaRPr lang="sv-SE" dirty="0"/>
           </a:p>
@@ -3851,6 +3852,1409 @@
 </p:sld>
 </file>
 
+<file path=ppt/slides/slide10.xml><?xml version="1.0" encoding="utf-8"?>
+<p:sld xmlns:a="http://schemas.openxmlformats.org/drawingml/2006/main" xmlns:r="http://schemas.openxmlformats.org/officeDocument/2006/relationships" xmlns:p="http://schemas.openxmlformats.org/presentationml/2006/main">
+  <p:cSld>
+    <p:spTree>
+      <p:nvGrpSpPr>
+        <p:cNvPr id="1" name=""/>
+        <p:cNvGrpSpPr/>
+        <p:nvPr/>
+      </p:nvGrpSpPr>
+      <p:grpSpPr>
+        <a:xfrm>
+          <a:off x="0" y="0"/>
+          <a:ext cx="0" cy="0"/>
+          <a:chOff x="0" y="0"/>
+          <a:chExt cx="0" cy="0"/>
+        </a:xfrm>
+      </p:grpSpPr>
+      <p:pic>
+        <p:nvPicPr>
+          <p:cNvPr id="1026" name="Picture 2"/>
+          <p:cNvPicPr>
+            <a:picLocks noChangeAspect="1" noChangeArrowheads="1"/>
+          </p:cNvPicPr>
+          <p:nvPr/>
+        </p:nvPicPr>
+        <p:blipFill>
+          <a:blip r:embed="rId2" cstate="print"/>
+          <a:srcRect/>
+          <a:stretch>
+            <a:fillRect/>
+          </a:stretch>
+        </p:blipFill>
+        <p:spPr bwMode="auto">
+          <a:xfrm>
+            <a:off x="7308304" y="2708920"/>
+            <a:ext cx="1224136" cy="1254486"/>
+          </a:xfrm>
+          <a:prstGeom prst="rect">
+            <a:avLst/>
+          </a:prstGeom>
+          <a:noFill/>
+          <a:ln w="9525">
+            <a:noFill/>
+            <a:miter lim="800000"/>
+            <a:headEnd/>
+            <a:tailEnd/>
+          </a:ln>
+        </p:spPr>
+      </p:pic>
+      <p:pic>
+        <p:nvPicPr>
+          <p:cNvPr id="1027" name="Picture 3"/>
+          <p:cNvPicPr>
+            <a:picLocks noChangeAspect="1" noChangeArrowheads="1"/>
+          </p:cNvPicPr>
+          <p:nvPr/>
+        </p:nvPicPr>
+        <p:blipFill>
+          <a:blip r:embed="rId3" cstate="print"/>
+          <a:srcRect/>
+          <a:stretch>
+            <a:fillRect/>
+          </a:stretch>
+        </p:blipFill>
+        <p:spPr bwMode="auto">
+          <a:xfrm>
+            <a:off x="5076056" y="2708920"/>
+            <a:ext cx="1224136" cy="1251040"/>
+          </a:xfrm>
+          <a:prstGeom prst="rect">
+            <a:avLst/>
+          </a:prstGeom>
+          <a:noFill/>
+          <a:ln w="9525">
+            <a:noFill/>
+            <a:miter lim="800000"/>
+            <a:headEnd/>
+            <a:tailEnd/>
+          </a:ln>
+        </p:spPr>
+      </p:pic>
+      <p:pic>
+        <p:nvPicPr>
+          <p:cNvPr id="1028" name="Picture 4"/>
+          <p:cNvPicPr>
+            <a:picLocks noChangeAspect="1" noChangeArrowheads="1"/>
+          </p:cNvPicPr>
+          <p:nvPr/>
+        </p:nvPicPr>
+        <p:blipFill>
+          <a:blip r:embed="rId4" cstate="print"/>
+          <a:srcRect/>
+          <a:stretch>
+            <a:fillRect/>
+          </a:stretch>
+        </p:blipFill>
+        <p:spPr bwMode="auto">
+          <a:xfrm>
+            <a:off x="3059832" y="2636912"/>
+            <a:ext cx="1224136" cy="1251040"/>
+          </a:xfrm>
+          <a:prstGeom prst="rect">
+            <a:avLst/>
+          </a:prstGeom>
+          <a:noFill/>
+          <a:ln w="9525">
+            <a:noFill/>
+            <a:miter lim="800000"/>
+            <a:headEnd/>
+            <a:tailEnd/>
+          </a:ln>
+        </p:spPr>
+      </p:pic>
+      <p:pic>
+        <p:nvPicPr>
+          <p:cNvPr id="1029" name="Picture 5"/>
+          <p:cNvPicPr>
+            <a:picLocks noChangeAspect="1" noChangeArrowheads="1"/>
+          </p:cNvPicPr>
+          <p:nvPr/>
+        </p:nvPicPr>
+        <p:blipFill>
+          <a:blip r:embed="rId5" cstate="print"/>
+          <a:srcRect/>
+          <a:stretch>
+            <a:fillRect/>
+          </a:stretch>
+        </p:blipFill>
+        <p:spPr bwMode="auto">
+          <a:xfrm>
+            <a:off x="755576" y="2636912"/>
+            <a:ext cx="1281940" cy="1296144"/>
+          </a:xfrm>
+          <a:prstGeom prst="rect">
+            <a:avLst/>
+          </a:prstGeom>
+          <a:noFill/>
+          <a:ln w="9525">
+            <a:noFill/>
+            <a:miter lim="800000"/>
+            <a:headEnd/>
+            <a:tailEnd/>
+          </a:ln>
+        </p:spPr>
+      </p:pic>
+      <p:cxnSp>
+        <p:nvCxnSpPr>
+          <p:cNvPr id="15" name="Kurva 14"/>
+          <p:cNvCxnSpPr>
+            <a:stCxn id="1028" idx="0"/>
+            <a:endCxn id="1027" idx="0"/>
+          </p:cNvCxnSpPr>
+          <p:nvPr/>
+        </p:nvCxnSpPr>
+        <p:spPr>
+          <a:xfrm rot="16200000" flipH="1">
+            <a:off x="4644008" y="1664804"/>
+            <a:ext cx="72008" cy="2016224"/>
+          </a:xfrm>
+          <a:prstGeom prst="curvedConnector3">
+            <a:avLst>
+              <a:gd name="adj1" fmla="val -1267757"/>
+            </a:avLst>
+          </a:prstGeom>
+          <a:ln w="38100">
+            <a:solidFill>
+              <a:schemeClr val="tx1"/>
+            </a:solidFill>
+            <a:tailEnd type="arrow"/>
+          </a:ln>
+        </p:spPr>
+        <p:style>
+          <a:lnRef idx="1">
+            <a:schemeClr val="accent1"/>
+          </a:lnRef>
+          <a:fillRef idx="0">
+            <a:schemeClr val="accent1"/>
+          </a:fillRef>
+          <a:effectRef idx="0">
+            <a:schemeClr val="accent1"/>
+          </a:effectRef>
+          <a:fontRef idx="minor">
+            <a:schemeClr val="tx1"/>
+          </a:fontRef>
+        </p:style>
+      </p:cxnSp>
+      <p:cxnSp>
+        <p:nvCxnSpPr>
+          <p:cNvPr id="18" name="Kurva 17"/>
+          <p:cNvCxnSpPr>
+            <a:stCxn id="1027" idx="2"/>
+            <a:endCxn id="1028" idx="2"/>
+          </p:cNvCxnSpPr>
+          <p:nvPr/>
+        </p:nvCxnSpPr>
+        <p:spPr>
+          <a:xfrm rot="5400000" flipH="1">
+            <a:off x="4644008" y="2915844"/>
+            <a:ext cx="72008" cy="2016224"/>
+          </a:xfrm>
+          <a:prstGeom prst="curvedConnector3">
+            <a:avLst>
+              <a:gd name="adj1" fmla="val -1015469"/>
+            </a:avLst>
+          </a:prstGeom>
+          <a:ln w="38100">
+            <a:solidFill>
+              <a:schemeClr val="tx1"/>
+            </a:solidFill>
+            <a:tailEnd type="arrow"/>
+          </a:ln>
+        </p:spPr>
+        <p:style>
+          <a:lnRef idx="1">
+            <a:schemeClr val="accent1"/>
+          </a:lnRef>
+          <a:fillRef idx="0">
+            <a:schemeClr val="accent1"/>
+          </a:fillRef>
+          <a:effectRef idx="0">
+            <a:schemeClr val="accent1"/>
+          </a:effectRef>
+          <a:fontRef idx="minor">
+            <a:schemeClr val="tx1"/>
+          </a:fontRef>
+        </p:style>
+      </p:cxnSp>
+      <p:sp>
+        <p:nvSpPr>
+          <p:cNvPr id="1031" name="Rectangle 7"/>
+          <p:cNvSpPr>
+            <a:spLocks noChangeArrowheads="1"/>
+          </p:cNvSpPr>
+          <p:nvPr/>
+        </p:nvSpPr>
+        <p:spPr bwMode="auto">
+          <a:xfrm>
+            <a:off x="0" y="0"/>
+            <a:ext cx="9144000" cy="457200"/>
+          </a:xfrm>
+          <a:prstGeom prst="rect">
+            <a:avLst/>
+          </a:prstGeom>
+          <a:noFill/>
+          <a:ln w="9525">
+            <a:noFill/>
+            <a:miter lim="800000"/>
+            <a:headEnd/>
+            <a:tailEnd/>
+          </a:ln>
+          <a:effectLst/>
+        </p:spPr>
+        <p:txBody>
+          <a:bodyPr vert="horz" wrap="none" lIns="91440" tIns="45720" rIns="91440" bIns="45720" numCol="1" anchor="ctr" anchorCtr="0" compatLnSpc="1">
+            <a:prstTxWarp prst="textNoShape">
+              <a:avLst/>
+            </a:prstTxWarp>
+            <a:spAutoFit/>
+          </a:bodyPr>
+          <a:lstStyle/>
+          <a:p>
+            <a:endParaRPr lang="sv-SE" dirty="0"/>
+          </a:p>
+        </p:txBody>
+      </p:sp>
+      <p:sp>
+        <p:nvSpPr>
+          <p:cNvPr id="1040" name="Rectangle 16"/>
+          <p:cNvSpPr>
+            <a:spLocks noChangeArrowheads="1"/>
+          </p:cNvSpPr>
+          <p:nvPr/>
+        </p:nvSpPr>
+        <p:spPr bwMode="auto">
+          <a:xfrm>
+            <a:off x="0" y="0"/>
+            <a:ext cx="9144000" cy="457200"/>
+          </a:xfrm>
+          <a:prstGeom prst="rect">
+            <a:avLst/>
+          </a:prstGeom>
+          <a:noFill/>
+          <a:ln w="9525">
+            <a:noFill/>
+            <a:miter lim="800000"/>
+            <a:headEnd/>
+            <a:tailEnd/>
+          </a:ln>
+          <a:effectLst/>
+        </p:spPr>
+        <p:txBody>
+          <a:bodyPr vert="horz" wrap="none" lIns="91440" tIns="45720" rIns="91440" bIns="45720" numCol="1" anchor="ctr" anchorCtr="0" compatLnSpc="1">
+            <a:prstTxWarp prst="textNoShape">
+              <a:avLst/>
+            </a:prstTxWarp>
+            <a:spAutoFit/>
+          </a:bodyPr>
+          <a:lstStyle/>
+          <a:p>
+            <a:endParaRPr lang="sv-SE" dirty="0"/>
+          </a:p>
+        </p:txBody>
+      </p:sp>
+      <p:pic>
+        <p:nvPicPr>
+          <p:cNvPr id="1039" name="Picture 15"/>
+          <p:cNvPicPr>
+            <a:picLocks noChangeAspect="1" noChangeArrowheads="1"/>
+          </p:cNvPicPr>
+          <p:nvPr/>
+        </p:nvPicPr>
+        <p:blipFill>
+          <a:blip r:embed="rId6" cstate="print">
+            <a:clrChange>
+              <a:clrFrom>
+                <a:srgbClr val="FFFFFF"/>
+              </a:clrFrom>
+              <a:clrTo>
+                <a:srgbClr val="FFFFFF">
+                  <a:alpha val="0"/>
+                </a:srgbClr>
+              </a:clrTo>
+            </a:clrChange>
+          </a:blip>
+          <a:srcRect/>
+          <a:stretch>
+            <a:fillRect/>
+          </a:stretch>
+        </p:blipFill>
+        <p:spPr bwMode="auto">
+          <a:xfrm>
+            <a:off x="3995936" y="1268760"/>
+            <a:ext cx="1362075" cy="409575"/>
+          </a:xfrm>
+          <a:prstGeom prst="rect">
+            <a:avLst/>
+          </a:prstGeom>
+          <a:noFill/>
+        </p:spPr>
+      </p:pic>
+      <p:sp>
+        <p:nvSpPr>
+          <p:cNvPr id="1041" name="Rectangle 17"/>
+          <p:cNvSpPr>
+            <a:spLocks noChangeArrowheads="1"/>
+          </p:cNvSpPr>
+          <p:nvPr/>
+        </p:nvSpPr>
+        <p:spPr bwMode="auto">
+          <a:xfrm>
+            <a:off x="0" y="866775"/>
+            <a:ext cx="9144000" cy="0"/>
+          </a:xfrm>
+          <a:prstGeom prst="rect">
+            <a:avLst/>
+          </a:prstGeom>
+          <a:noFill/>
+          <a:ln w="9525">
+            <a:noFill/>
+            <a:miter lim="800000"/>
+            <a:headEnd/>
+            <a:tailEnd/>
+          </a:ln>
+          <a:effectLst/>
+        </p:spPr>
+        <p:txBody>
+          <a:bodyPr vert="horz" wrap="none" lIns="91440" tIns="45720" rIns="91440" bIns="45720" numCol="1" anchor="ctr" anchorCtr="0" compatLnSpc="1">
+            <a:prstTxWarp prst="textNoShape">
+              <a:avLst/>
+            </a:prstTxWarp>
+            <a:spAutoFit/>
+          </a:bodyPr>
+          <a:lstStyle/>
+          <a:p>
+            <a:pPr marL="0" marR="0" lvl="0" indent="0" algn="l" defTabSz="914400" rtl="0" eaLnBrk="1" fontAlgn="base" latinLnBrk="0" hangingPunct="1">
+              <a:lnSpc>
+                <a:spcPct val="100000"/>
+              </a:lnSpc>
+              <a:spcBef>
+                <a:spcPct val="0"/>
+              </a:spcBef>
+              <a:spcAft>
+                <a:spcPct val="0"/>
+              </a:spcAft>
+              <a:buClrTx/>
+              <a:buSzTx/>
+              <a:buFontTx/>
+              <a:buNone/>
+              <a:tabLst/>
+            </a:pPr>
+            <a:endParaRPr kumimoji="0" lang="sv-SE" sz="1800" b="0" i="0" u="none" strike="noStrike" cap="none" normalizeH="0" baseline="0" dirty="0" smtClean="0">
+              <a:ln>
+                <a:noFill/>
+              </a:ln>
+              <a:solidFill>
+                <a:schemeClr val="tx1"/>
+              </a:solidFill>
+              <a:effectLst/>
+              <a:latin typeface="Arial" pitchFamily="34" charset="0"/>
+              <a:cs typeface="Arial" pitchFamily="34" charset="0"/>
+            </a:endParaRPr>
+          </a:p>
+        </p:txBody>
+      </p:sp>
+      <p:sp>
+        <p:nvSpPr>
+          <p:cNvPr id="1043" name="Rectangle 19"/>
+          <p:cNvSpPr>
+            <a:spLocks noChangeArrowheads="1"/>
+          </p:cNvSpPr>
+          <p:nvPr/>
+        </p:nvSpPr>
+        <p:spPr bwMode="auto">
+          <a:xfrm>
+            <a:off x="0" y="0"/>
+            <a:ext cx="9144000" cy="0"/>
+          </a:xfrm>
+          <a:prstGeom prst="rect">
+            <a:avLst/>
+          </a:prstGeom>
+          <a:noFill/>
+          <a:ln w="9525">
+            <a:noFill/>
+            <a:miter lim="800000"/>
+            <a:headEnd/>
+            <a:tailEnd/>
+          </a:ln>
+          <a:effectLst/>
+        </p:spPr>
+        <p:txBody>
+          <a:bodyPr vert="horz" wrap="none" lIns="91440" tIns="45720" rIns="91440" bIns="45720" numCol="1" anchor="ctr" anchorCtr="0" compatLnSpc="1">
+            <a:prstTxWarp prst="textNoShape">
+              <a:avLst/>
+            </a:prstTxWarp>
+            <a:spAutoFit/>
+          </a:bodyPr>
+          <a:lstStyle/>
+          <a:p>
+            <a:endParaRPr lang="sv-SE" dirty="0"/>
+          </a:p>
+        </p:txBody>
+      </p:sp>
+      <p:pic>
+        <p:nvPicPr>
+          <p:cNvPr id="1042" name="Picture 18"/>
+          <p:cNvPicPr>
+            <a:picLocks noChangeAspect="1" noChangeArrowheads="1"/>
+          </p:cNvPicPr>
+          <p:nvPr/>
+        </p:nvPicPr>
+        <p:blipFill>
+          <a:blip r:embed="rId7" cstate="print">
+            <a:clrChange>
+              <a:clrFrom>
+                <a:srgbClr val="FFFFFF"/>
+              </a:clrFrom>
+              <a:clrTo>
+                <a:srgbClr val="FFFFFF">
+                  <a:alpha val="0"/>
+                </a:srgbClr>
+              </a:clrTo>
+            </a:clrChange>
+          </a:blip>
+          <a:srcRect/>
+          <a:stretch>
+            <a:fillRect/>
+          </a:stretch>
+        </p:blipFill>
+        <p:spPr bwMode="auto">
+          <a:xfrm>
+            <a:off x="4067944" y="4797152"/>
+            <a:ext cx="1362075" cy="409575"/>
+          </a:xfrm>
+          <a:prstGeom prst="rect">
+            <a:avLst/>
+          </a:prstGeom>
+          <a:noFill/>
+        </p:spPr>
+      </p:pic>
+      <p:cxnSp>
+        <p:nvCxnSpPr>
+          <p:cNvPr id="40" name="Rak pil 39"/>
+          <p:cNvCxnSpPr/>
+          <p:nvPr/>
+        </p:nvCxnSpPr>
+        <p:spPr>
+          <a:xfrm>
+            <a:off x="2051720" y="2924944"/>
+            <a:ext cx="1008112" cy="0"/>
+          </a:xfrm>
+          <a:prstGeom prst="straightConnector1">
+            <a:avLst/>
+          </a:prstGeom>
+          <a:ln>
+            <a:tailEnd type="arrow"/>
+          </a:ln>
+        </p:spPr>
+        <p:style>
+          <a:lnRef idx="3">
+            <a:schemeClr val="accent1"/>
+          </a:lnRef>
+          <a:fillRef idx="0">
+            <a:schemeClr val="accent1"/>
+          </a:fillRef>
+          <a:effectRef idx="2">
+            <a:schemeClr val="accent1"/>
+          </a:effectRef>
+          <a:fontRef idx="minor">
+            <a:schemeClr val="tx1"/>
+          </a:fontRef>
+        </p:style>
+      </p:cxnSp>
+      <p:cxnSp>
+        <p:nvCxnSpPr>
+          <p:cNvPr id="41" name="Rak pil 40"/>
+          <p:cNvCxnSpPr/>
+          <p:nvPr/>
+        </p:nvCxnSpPr>
+        <p:spPr>
+          <a:xfrm>
+            <a:off x="4283968" y="2924944"/>
+            <a:ext cx="792088" cy="0"/>
+          </a:xfrm>
+          <a:prstGeom prst="straightConnector1">
+            <a:avLst/>
+          </a:prstGeom>
+          <a:ln>
+            <a:tailEnd type="arrow"/>
+          </a:ln>
+        </p:spPr>
+        <p:style>
+          <a:lnRef idx="3">
+            <a:schemeClr val="accent1"/>
+          </a:lnRef>
+          <a:fillRef idx="0">
+            <a:schemeClr val="accent1"/>
+          </a:fillRef>
+          <a:effectRef idx="2">
+            <a:schemeClr val="accent1"/>
+          </a:effectRef>
+          <a:fontRef idx="minor">
+            <a:schemeClr val="tx1"/>
+          </a:fontRef>
+        </p:style>
+      </p:cxnSp>
+      <p:cxnSp>
+        <p:nvCxnSpPr>
+          <p:cNvPr id="43" name="Rak pil 42"/>
+          <p:cNvCxnSpPr/>
+          <p:nvPr/>
+        </p:nvCxnSpPr>
+        <p:spPr>
+          <a:xfrm>
+            <a:off x="6300192" y="2924944"/>
+            <a:ext cx="1008112" cy="0"/>
+          </a:xfrm>
+          <a:prstGeom prst="straightConnector1">
+            <a:avLst/>
+          </a:prstGeom>
+          <a:ln>
+            <a:tailEnd type="arrow"/>
+          </a:ln>
+        </p:spPr>
+        <p:style>
+          <a:lnRef idx="3">
+            <a:schemeClr val="accent1"/>
+          </a:lnRef>
+          <a:fillRef idx="0">
+            <a:schemeClr val="accent1"/>
+          </a:fillRef>
+          <a:effectRef idx="2">
+            <a:schemeClr val="accent1"/>
+          </a:effectRef>
+          <a:fontRef idx="minor">
+            <a:schemeClr val="tx1"/>
+          </a:fontRef>
+        </p:style>
+      </p:cxnSp>
+      <p:cxnSp>
+        <p:nvCxnSpPr>
+          <p:cNvPr id="44" name="Rak pil 43"/>
+          <p:cNvCxnSpPr/>
+          <p:nvPr/>
+        </p:nvCxnSpPr>
+        <p:spPr>
+          <a:xfrm flipH="1">
+            <a:off x="6300192" y="3645024"/>
+            <a:ext cx="1008112" cy="0"/>
+          </a:xfrm>
+          <a:prstGeom prst="straightConnector1">
+            <a:avLst/>
+          </a:prstGeom>
+          <a:ln>
+            <a:tailEnd type="arrow"/>
+          </a:ln>
+        </p:spPr>
+        <p:style>
+          <a:lnRef idx="3">
+            <a:schemeClr val="accent2"/>
+          </a:lnRef>
+          <a:fillRef idx="0">
+            <a:schemeClr val="accent2"/>
+          </a:fillRef>
+          <a:effectRef idx="2">
+            <a:schemeClr val="accent2"/>
+          </a:effectRef>
+          <a:fontRef idx="minor">
+            <a:schemeClr val="tx1"/>
+          </a:fontRef>
+        </p:style>
+      </p:cxnSp>
+      <p:cxnSp>
+        <p:nvCxnSpPr>
+          <p:cNvPr id="47" name="Rak pil 46"/>
+          <p:cNvCxnSpPr/>
+          <p:nvPr/>
+        </p:nvCxnSpPr>
+        <p:spPr>
+          <a:xfrm flipH="1">
+            <a:off x="4283968" y="3645024"/>
+            <a:ext cx="792088" cy="0"/>
+          </a:xfrm>
+          <a:prstGeom prst="straightConnector1">
+            <a:avLst/>
+          </a:prstGeom>
+          <a:ln>
+            <a:tailEnd type="arrow"/>
+          </a:ln>
+        </p:spPr>
+        <p:style>
+          <a:lnRef idx="3">
+            <a:schemeClr val="accent2"/>
+          </a:lnRef>
+          <a:fillRef idx="0">
+            <a:schemeClr val="accent2"/>
+          </a:fillRef>
+          <a:effectRef idx="2">
+            <a:schemeClr val="accent2"/>
+          </a:effectRef>
+          <a:fontRef idx="minor">
+            <a:schemeClr val="tx1"/>
+          </a:fontRef>
+        </p:style>
+      </p:cxnSp>
+      <p:cxnSp>
+        <p:nvCxnSpPr>
+          <p:cNvPr id="49" name="Rak pil 48"/>
+          <p:cNvCxnSpPr/>
+          <p:nvPr/>
+        </p:nvCxnSpPr>
+        <p:spPr>
+          <a:xfrm flipH="1">
+            <a:off x="2051720" y="3645024"/>
+            <a:ext cx="1008112" cy="0"/>
+          </a:xfrm>
+          <a:prstGeom prst="straightConnector1">
+            <a:avLst/>
+          </a:prstGeom>
+          <a:ln>
+            <a:tailEnd type="arrow"/>
+          </a:ln>
+        </p:spPr>
+        <p:style>
+          <a:lnRef idx="3">
+            <a:schemeClr val="accent2"/>
+          </a:lnRef>
+          <a:fillRef idx="0">
+            <a:schemeClr val="accent2"/>
+          </a:fillRef>
+          <a:effectRef idx="2">
+            <a:schemeClr val="accent2"/>
+          </a:effectRef>
+          <a:fontRef idx="minor">
+            <a:schemeClr val="tx1"/>
+          </a:fontRef>
+        </p:style>
+      </p:cxnSp>
+      <p:sp>
+        <p:nvSpPr>
+          <p:cNvPr id="50" name="textruta 49"/>
+          <p:cNvSpPr txBox="1"/>
+          <p:nvPr/>
+        </p:nvSpPr>
+        <p:spPr>
+          <a:xfrm>
+            <a:off x="1979712" y="2636912"/>
+            <a:ext cx="962508" cy="369332"/>
+          </a:xfrm>
+          <a:prstGeom prst="rect">
+            <a:avLst/>
+          </a:prstGeom>
+          <a:noFill/>
+        </p:spPr>
+        <p:txBody>
+          <a:bodyPr wrap="none" rtlCol="0">
+            <a:spAutoFit/>
+          </a:bodyPr>
+          <a:lstStyle/>
+          <a:p>
+            <a:r>
+              <a:rPr lang="sv-SE" dirty="0" smtClean="0"/>
+              <a:t>Forward</a:t>
+            </a:r>
+            <a:endParaRPr lang="sv-SE" dirty="0"/>
+          </a:p>
+        </p:txBody>
+      </p:sp>
+      <p:sp>
+        <p:nvSpPr>
+          <p:cNvPr id="51" name="textruta 50"/>
+          <p:cNvSpPr txBox="1"/>
+          <p:nvPr/>
+        </p:nvSpPr>
+        <p:spPr>
+          <a:xfrm>
+            <a:off x="6444208" y="3356992"/>
+            <a:ext cx="918649" cy="369332"/>
+          </a:xfrm>
+          <a:prstGeom prst="rect">
+            <a:avLst/>
+          </a:prstGeom>
+          <a:noFill/>
+        </p:spPr>
+        <p:txBody>
+          <a:bodyPr wrap="none" rtlCol="0">
+            <a:spAutoFit/>
+          </a:bodyPr>
+          <a:lstStyle/>
+          <a:p>
+            <a:r>
+              <a:rPr lang="sv-SE" dirty="0" smtClean="0"/>
+              <a:t>Reverse</a:t>
+            </a:r>
+            <a:endParaRPr lang="sv-SE" dirty="0"/>
+          </a:p>
+        </p:txBody>
+      </p:sp>
+      <p:sp>
+        <p:nvSpPr>
+          <p:cNvPr id="1045" name="Rectangle 21"/>
+          <p:cNvSpPr>
+            <a:spLocks noChangeArrowheads="1"/>
+          </p:cNvSpPr>
+          <p:nvPr/>
+        </p:nvSpPr>
+        <p:spPr bwMode="auto">
+          <a:xfrm>
+            <a:off x="0" y="0"/>
+            <a:ext cx="9144000" cy="457200"/>
+          </a:xfrm>
+          <a:prstGeom prst="rect">
+            <a:avLst/>
+          </a:prstGeom>
+          <a:noFill/>
+          <a:ln w="9525">
+            <a:noFill/>
+            <a:miter lim="800000"/>
+            <a:headEnd/>
+            <a:tailEnd/>
+          </a:ln>
+          <a:effectLst/>
+        </p:spPr>
+        <p:txBody>
+          <a:bodyPr vert="horz" wrap="none" lIns="91440" tIns="45720" rIns="91440" bIns="45720" numCol="1" anchor="ctr" anchorCtr="0" compatLnSpc="1">
+            <a:prstTxWarp prst="textNoShape">
+              <a:avLst/>
+            </a:prstTxWarp>
+            <a:spAutoFit/>
+          </a:bodyPr>
+          <a:lstStyle/>
+          <a:p>
+            <a:endParaRPr lang="sv-SE"/>
+          </a:p>
+        </p:txBody>
+      </p:sp>
+      <p:pic>
+        <p:nvPicPr>
+          <p:cNvPr id="1044" name="Picture 20"/>
+          <p:cNvPicPr>
+            <a:picLocks noChangeAspect="1" noChangeArrowheads="1"/>
+          </p:cNvPicPr>
+          <p:nvPr/>
+        </p:nvPicPr>
+        <p:blipFill>
+          <a:blip r:embed="rId8" cstate="print">
+            <a:clrChange>
+              <a:clrFrom>
+                <a:srgbClr val="FFFFFF"/>
+              </a:clrFrom>
+              <a:clrTo>
+                <a:srgbClr val="FFFFFF">
+                  <a:alpha val="0"/>
+                </a:srgbClr>
+              </a:clrTo>
+            </a:clrChange>
+          </a:blip>
+          <a:srcRect/>
+          <a:stretch>
+            <a:fillRect/>
+          </a:stretch>
+        </p:blipFill>
+        <p:spPr bwMode="auto">
+          <a:xfrm>
+            <a:off x="827584" y="2204864"/>
+            <a:ext cx="304800" cy="409575"/>
+          </a:xfrm>
+          <a:prstGeom prst="rect">
+            <a:avLst/>
+          </a:prstGeom>
+          <a:noFill/>
+        </p:spPr>
+      </p:pic>
+      <p:sp>
+        <p:nvSpPr>
+          <p:cNvPr id="1046" name="Rectangle 22"/>
+          <p:cNvSpPr>
+            <a:spLocks noChangeArrowheads="1"/>
+          </p:cNvSpPr>
+          <p:nvPr/>
+        </p:nvSpPr>
+        <p:spPr bwMode="auto">
+          <a:xfrm>
+            <a:off x="0" y="866775"/>
+            <a:ext cx="9144000" cy="0"/>
+          </a:xfrm>
+          <a:prstGeom prst="rect">
+            <a:avLst/>
+          </a:prstGeom>
+          <a:noFill/>
+          <a:ln w="9525">
+            <a:noFill/>
+            <a:miter lim="800000"/>
+            <a:headEnd/>
+            <a:tailEnd/>
+          </a:ln>
+          <a:effectLst/>
+        </p:spPr>
+        <p:txBody>
+          <a:bodyPr vert="horz" wrap="none" lIns="91440" tIns="45720" rIns="91440" bIns="45720" numCol="1" anchor="ctr" anchorCtr="0" compatLnSpc="1">
+            <a:prstTxWarp prst="textNoShape">
+              <a:avLst/>
+            </a:prstTxWarp>
+            <a:spAutoFit/>
+          </a:bodyPr>
+          <a:lstStyle/>
+          <a:p>
+            <a:pPr marL="0" marR="0" lvl="0" indent="0" algn="l" defTabSz="914400" rtl="0" eaLnBrk="1" fontAlgn="base" latinLnBrk="0" hangingPunct="1">
+              <a:lnSpc>
+                <a:spcPct val="100000"/>
+              </a:lnSpc>
+              <a:spcBef>
+                <a:spcPct val="0"/>
+              </a:spcBef>
+              <a:spcAft>
+                <a:spcPct val="0"/>
+              </a:spcAft>
+              <a:buClrTx/>
+              <a:buSzTx/>
+              <a:buFontTx/>
+              <a:buNone/>
+              <a:tabLst/>
+            </a:pPr>
+            <a:endParaRPr kumimoji="0" lang="sv-SE" sz="1800" b="0" i="0" u="none" strike="noStrike" cap="none" normalizeH="0" baseline="0" smtClean="0">
+              <a:ln>
+                <a:noFill/>
+              </a:ln>
+              <a:solidFill>
+                <a:schemeClr val="tx1"/>
+              </a:solidFill>
+              <a:effectLst/>
+              <a:latin typeface="Arial" pitchFamily="34" charset="0"/>
+              <a:cs typeface="Arial" pitchFamily="34" charset="0"/>
+            </a:endParaRPr>
+          </a:p>
+        </p:txBody>
+      </p:sp>
+      <p:sp>
+        <p:nvSpPr>
+          <p:cNvPr id="1048" name="Rectangle 24"/>
+          <p:cNvSpPr>
+            <a:spLocks noChangeArrowheads="1"/>
+          </p:cNvSpPr>
+          <p:nvPr/>
+        </p:nvSpPr>
+        <p:spPr bwMode="auto">
+          <a:xfrm>
+            <a:off x="0" y="0"/>
+            <a:ext cx="9144000" cy="457200"/>
+          </a:xfrm>
+          <a:prstGeom prst="rect">
+            <a:avLst/>
+          </a:prstGeom>
+          <a:noFill/>
+          <a:ln w="9525">
+            <a:noFill/>
+            <a:miter lim="800000"/>
+            <a:headEnd/>
+            <a:tailEnd/>
+          </a:ln>
+          <a:effectLst/>
+        </p:spPr>
+        <p:txBody>
+          <a:bodyPr vert="horz" wrap="none" lIns="91440" tIns="45720" rIns="91440" bIns="45720" numCol="1" anchor="ctr" anchorCtr="0" compatLnSpc="1">
+            <a:prstTxWarp prst="textNoShape">
+              <a:avLst/>
+            </a:prstTxWarp>
+            <a:spAutoFit/>
+          </a:bodyPr>
+          <a:lstStyle/>
+          <a:p>
+            <a:endParaRPr lang="sv-SE"/>
+          </a:p>
+        </p:txBody>
+      </p:sp>
+      <p:sp>
+        <p:nvSpPr>
+          <p:cNvPr id="1049" name="Rectangle 25"/>
+          <p:cNvSpPr>
+            <a:spLocks noChangeArrowheads="1"/>
+          </p:cNvSpPr>
+          <p:nvPr/>
+        </p:nvSpPr>
+        <p:spPr bwMode="auto">
+          <a:xfrm>
+            <a:off x="0" y="866775"/>
+            <a:ext cx="9144000" cy="0"/>
+          </a:xfrm>
+          <a:prstGeom prst="rect">
+            <a:avLst/>
+          </a:prstGeom>
+          <a:noFill/>
+          <a:ln w="9525">
+            <a:noFill/>
+            <a:miter lim="800000"/>
+            <a:headEnd/>
+            <a:tailEnd/>
+          </a:ln>
+          <a:effectLst/>
+        </p:spPr>
+        <p:txBody>
+          <a:bodyPr vert="horz" wrap="none" lIns="91440" tIns="45720" rIns="91440" bIns="45720" numCol="1" anchor="ctr" anchorCtr="0" compatLnSpc="1">
+            <a:prstTxWarp prst="textNoShape">
+              <a:avLst/>
+            </a:prstTxWarp>
+            <a:spAutoFit/>
+          </a:bodyPr>
+          <a:lstStyle/>
+          <a:p>
+            <a:pPr marL="0" marR="0" lvl="0" indent="0" algn="l" defTabSz="914400" rtl="0" eaLnBrk="1" fontAlgn="base" latinLnBrk="0" hangingPunct="1">
+              <a:lnSpc>
+                <a:spcPct val="100000"/>
+              </a:lnSpc>
+              <a:spcBef>
+                <a:spcPct val="0"/>
+              </a:spcBef>
+              <a:spcAft>
+                <a:spcPct val="0"/>
+              </a:spcAft>
+              <a:buClrTx/>
+              <a:buSzTx/>
+              <a:buFontTx/>
+              <a:buNone/>
+              <a:tabLst/>
+            </a:pPr>
+            <a:endParaRPr kumimoji="0" lang="sv-SE" sz="1800" b="0" i="0" u="none" strike="noStrike" cap="none" normalizeH="0" baseline="0" smtClean="0">
+              <a:ln>
+                <a:noFill/>
+              </a:ln>
+              <a:solidFill>
+                <a:schemeClr val="tx1"/>
+              </a:solidFill>
+              <a:effectLst/>
+              <a:latin typeface="Arial" pitchFamily="34" charset="0"/>
+              <a:cs typeface="Arial" pitchFamily="34" charset="0"/>
+            </a:endParaRPr>
+          </a:p>
+        </p:txBody>
+      </p:sp>
+      <p:sp>
+        <p:nvSpPr>
+          <p:cNvPr id="1051" name="Rectangle 27"/>
+          <p:cNvSpPr>
+            <a:spLocks noChangeArrowheads="1"/>
+          </p:cNvSpPr>
+          <p:nvPr/>
+        </p:nvSpPr>
+        <p:spPr bwMode="auto">
+          <a:xfrm>
+            <a:off x="0" y="0"/>
+            <a:ext cx="9144000" cy="457200"/>
+          </a:xfrm>
+          <a:prstGeom prst="rect">
+            <a:avLst/>
+          </a:prstGeom>
+          <a:noFill/>
+          <a:ln w="9525">
+            <a:noFill/>
+            <a:miter lim="800000"/>
+            <a:headEnd/>
+            <a:tailEnd/>
+          </a:ln>
+          <a:effectLst/>
+        </p:spPr>
+        <p:txBody>
+          <a:bodyPr vert="horz" wrap="none" lIns="91440" tIns="45720" rIns="91440" bIns="45720" numCol="1" anchor="ctr" anchorCtr="0" compatLnSpc="1">
+            <a:prstTxWarp prst="textNoShape">
+              <a:avLst/>
+            </a:prstTxWarp>
+            <a:spAutoFit/>
+          </a:bodyPr>
+          <a:lstStyle/>
+          <a:p>
+            <a:endParaRPr lang="sv-SE"/>
+          </a:p>
+        </p:txBody>
+      </p:sp>
+      <p:pic>
+        <p:nvPicPr>
+          <p:cNvPr id="1050" name="Picture 26"/>
+          <p:cNvPicPr>
+            <a:picLocks noChangeAspect="1" noChangeArrowheads="1"/>
+          </p:cNvPicPr>
+          <p:nvPr/>
+        </p:nvPicPr>
+        <p:blipFill>
+          <a:blip r:embed="rId9" cstate="print">
+            <a:clrChange>
+              <a:clrFrom>
+                <a:srgbClr val="FFFFFF"/>
+              </a:clrFrom>
+              <a:clrTo>
+                <a:srgbClr val="FFFFFF">
+                  <a:alpha val="0"/>
+                </a:srgbClr>
+              </a:clrTo>
+            </a:clrChange>
+          </a:blip>
+          <a:srcRect/>
+          <a:stretch>
+            <a:fillRect/>
+          </a:stretch>
+        </p:blipFill>
+        <p:spPr bwMode="auto">
+          <a:xfrm>
+            <a:off x="3059832" y="2204864"/>
+            <a:ext cx="561975" cy="409575"/>
+          </a:xfrm>
+          <a:prstGeom prst="rect">
+            <a:avLst/>
+          </a:prstGeom>
+          <a:noFill/>
+        </p:spPr>
+      </p:pic>
+      <p:sp>
+        <p:nvSpPr>
+          <p:cNvPr id="1052" name="Rectangle 28"/>
+          <p:cNvSpPr>
+            <a:spLocks noChangeArrowheads="1"/>
+          </p:cNvSpPr>
+          <p:nvPr/>
+        </p:nvSpPr>
+        <p:spPr bwMode="auto">
+          <a:xfrm>
+            <a:off x="0" y="866775"/>
+            <a:ext cx="9144000" cy="0"/>
+          </a:xfrm>
+          <a:prstGeom prst="rect">
+            <a:avLst/>
+          </a:prstGeom>
+          <a:noFill/>
+          <a:ln w="9525">
+            <a:noFill/>
+            <a:miter lim="800000"/>
+            <a:headEnd/>
+            <a:tailEnd/>
+          </a:ln>
+          <a:effectLst/>
+        </p:spPr>
+        <p:txBody>
+          <a:bodyPr vert="horz" wrap="none" lIns="91440" tIns="45720" rIns="91440" bIns="45720" numCol="1" anchor="ctr" anchorCtr="0" compatLnSpc="1">
+            <a:prstTxWarp prst="textNoShape">
+              <a:avLst/>
+            </a:prstTxWarp>
+            <a:spAutoFit/>
+          </a:bodyPr>
+          <a:lstStyle/>
+          <a:p>
+            <a:pPr marL="0" marR="0" lvl="0" indent="0" algn="l" defTabSz="914400" rtl="0" eaLnBrk="1" fontAlgn="base" latinLnBrk="0" hangingPunct="1">
+              <a:lnSpc>
+                <a:spcPct val="100000"/>
+              </a:lnSpc>
+              <a:spcBef>
+                <a:spcPct val="0"/>
+              </a:spcBef>
+              <a:spcAft>
+                <a:spcPct val="0"/>
+              </a:spcAft>
+              <a:buClrTx/>
+              <a:buSzTx/>
+              <a:buFontTx/>
+              <a:buNone/>
+              <a:tabLst/>
+            </a:pPr>
+            <a:endParaRPr kumimoji="0" lang="sv-SE" sz="1800" b="0" i="0" u="none" strike="noStrike" cap="none" normalizeH="0" baseline="0" smtClean="0">
+              <a:ln>
+                <a:noFill/>
+              </a:ln>
+              <a:solidFill>
+                <a:schemeClr val="tx1"/>
+              </a:solidFill>
+              <a:effectLst/>
+              <a:latin typeface="Arial" pitchFamily="34" charset="0"/>
+              <a:cs typeface="Arial" pitchFamily="34" charset="0"/>
+            </a:endParaRPr>
+          </a:p>
+        </p:txBody>
+      </p:sp>
+      <p:sp>
+        <p:nvSpPr>
+          <p:cNvPr id="1054" name="Rectangle 30"/>
+          <p:cNvSpPr>
+            <a:spLocks noChangeArrowheads="1"/>
+          </p:cNvSpPr>
+          <p:nvPr/>
+        </p:nvSpPr>
+        <p:spPr bwMode="auto">
+          <a:xfrm>
+            <a:off x="0" y="0"/>
+            <a:ext cx="9144000" cy="457200"/>
+          </a:xfrm>
+          <a:prstGeom prst="rect">
+            <a:avLst/>
+          </a:prstGeom>
+          <a:noFill/>
+          <a:ln w="9525">
+            <a:noFill/>
+            <a:miter lim="800000"/>
+            <a:headEnd/>
+            <a:tailEnd/>
+          </a:ln>
+          <a:effectLst/>
+        </p:spPr>
+        <p:txBody>
+          <a:bodyPr vert="horz" wrap="none" lIns="91440" tIns="45720" rIns="91440" bIns="45720" numCol="1" anchor="ctr" anchorCtr="0" compatLnSpc="1">
+            <a:prstTxWarp prst="textNoShape">
+              <a:avLst/>
+            </a:prstTxWarp>
+            <a:spAutoFit/>
+          </a:bodyPr>
+          <a:lstStyle/>
+          <a:p>
+            <a:endParaRPr lang="sv-SE"/>
+          </a:p>
+        </p:txBody>
+      </p:sp>
+      <p:pic>
+        <p:nvPicPr>
+          <p:cNvPr id="1053" name="Picture 29"/>
+          <p:cNvPicPr>
+            <a:picLocks noChangeAspect="1" noChangeArrowheads="1"/>
+          </p:cNvPicPr>
+          <p:nvPr/>
+        </p:nvPicPr>
+        <p:blipFill>
+          <a:blip r:embed="rId10" cstate="print">
+            <a:clrChange>
+              <a:clrFrom>
+                <a:srgbClr val="FFFFFF"/>
+              </a:clrFrom>
+              <a:clrTo>
+                <a:srgbClr val="FFFFFF">
+                  <a:alpha val="0"/>
+                </a:srgbClr>
+              </a:clrTo>
+            </a:clrChange>
+          </a:blip>
+          <a:srcRect/>
+          <a:stretch>
+            <a:fillRect/>
+          </a:stretch>
+        </p:blipFill>
+        <p:spPr bwMode="auto">
+          <a:xfrm>
+            <a:off x="5076056" y="2276872"/>
+            <a:ext cx="276225" cy="409575"/>
+          </a:xfrm>
+          <a:prstGeom prst="rect">
+            <a:avLst/>
+          </a:prstGeom>
+          <a:noFill/>
+        </p:spPr>
+      </p:pic>
+      <p:sp>
+        <p:nvSpPr>
+          <p:cNvPr id="1055" name="Rectangle 31"/>
+          <p:cNvSpPr>
+            <a:spLocks noChangeArrowheads="1"/>
+          </p:cNvSpPr>
+          <p:nvPr/>
+        </p:nvSpPr>
+        <p:spPr bwMode="auto">
+          <a:xfrm>
+            <a:off x="0" y="866775"/>
+            <a:ext cx="9144000" cy="0"/>
+          </a:xfrm>
+          <a:prstGeom prst="rect">
+            <a:avLst/>
+          </a:prstGeom>
+          <a:noFill/>
+          <a:ln w="9525">
+            <a:noFill/>
+            <a:miter lim="800000"/>
+            <a:headEnd/>
+            <a:tailEnd/>
+          </a:ln>
+          <a:effectLst/>
+        </p:spPr>
+        <p:txBody>
+          <a:bodyPr vert="horz" wrap="none" lIns="91440" tIns="45720" rIns="91440" bIns="45720" numCol="1" anchor="ctr" anchorCtr="0" compatLnSpc="1">
+            <a:prstTxWarp prst="textNoShape">
+              <a:avLst/>
+            </a:prstTxWarp>
+            <a:spAutoFit/>
+          </a:bodyPr>
+          <a:lstStyle/>
+          <a:p>
+            <a:pPr marL="0" marR="0" lvl="0" indent="0" algn="l" defTabSz="914400" rtl="0" eaLnBrk="1" fontAlgn="base" latinLnBrk="0" hangingPunct="1">
+              <a:lnSpc>
+                <a:spcPct val="100000"/>
+              </a:lnSpc>
+              <a:spcBef>
+                <a:spcPct val="0"/>
+              </a:spcBef>
+              <a:spcAft>
+                <a:spcPct val="0"/>
+              </a:spcAft>
+              <a:buClrTx/>
+              <a:buSzTx/>
+              <a:buFontTx/>
+              <a:buNone/>
+              <a:tabLst/>
+            </a:pPr>
+            <a:endParaRPr kumimoji="0" lang="sv-SE" sz="1800" b="0" i="0" u="none" strike="noStrike" cap="none" normalizeH="0" baseline="0" smtClean="0">
+              <a:ln>
+                <a:noFill/>
+              </a:ln>
+              <a:solidFill>
+                <a:schemeClr val="tx1"/>
+              </a:solidFill>
+              <a:effectLst/>
+              <a:latin typeface="Arial" pitchFamily="34" charset="0"/>
+              <a:cs typeface="Arial" pitchFamily="34" charset="0"/>
+            </a:endParaRPr>
+          </a:p>
+        </p:txBody>
+      </p:sp>
+      <p:sp>
+        <p:nvSpPr>
+          <p:cNvPr id="1057" name="Rectangle 33"/>
+          <p:cNvSpPr>
+            <a:spLocks noChangeArrowheads="1"/>
+          </p:cNvSpPr>
+          <p:nvPr/>
+        </p:nvSpPr>
+        <p:spPr bwMode="auto">
+          <a:xfrm>
+            <a:off x="0" y="0"/>
+            <a:ext cx="9144000" cy="457200"/>
+          </a:xfrm>
+          <a:prstGeom prst="rect">
+            <a:avLst/>
+          </a:prstGeom>
+          <a:noFill/>
+          <a:ln w="9525">
+            <a:noFill/>
+            <a:miter lim="800000"/>
+            <a:headEnd/>
+            <a:tailEnd/>
+          </a:ln>
+          <a:effectLst/>
+        </p:spPr>
+        <p:txBody>
+          <a:bodyPr vert="horz" wrap="none" lIns="91440" tIns="45720" rIns="91440" bIns="45720" numCol="1" anchor="ctr" anchorCtr="0" compatLnSpc="1">
+            <a:prstTxWarp prst="textNoShape">
+              <a:avLst/>
+            </a:prstTxWarp>
+            <a:spAutoFit/>
+          </a:bodyPr>
+          <a:lstStyle/>
+          <a:p>
+            <a:endParaRPr lang="sv-SE"/>
+          </a:p>
+        </p:txBody>
+      </p:sp>
+      <p:pic>
+        <p:nvPicPr>
+          <p:cNvPr id="1056" name="Picture 32"/>
+          <p:cNvPicPr>
+            <a:picLocks noChangeAspect="1" noChangeArrowheads="1"/>
+          </p:cNvPicPr>
+          <p:nvPr/>
+        </p:nvPicPr>
+        <p:blipFill>
+          <a:blip r:embed="rId11" cstate="print">
+            <a:clrChange>
+              <a:clrFrom>
+                <a:srgbClr val="FFFFFF"/>
+              </a:clrFrom>
+              <a:clrTo>
+                <a:srgbClr val="FFFFFF">
+                  <a:alpha val="0"/>
+                </a:srgbClr>
+              </a:clrTo>
+            </a:clrChange>
+          </a:blip>
+          <a:srcRect/>
+          <a:stretch>
+            <a:fillRect/>
+          </a:stretch>
+        </p:blipFill>
+        <p:spPr bwMode="auto">
+          <a:xfrm>
+            <a:off x="7308304" y="2276872"/>
+            <a:ext cx="323850" cy="409575"/>
+          </a:xfrm>
+          <a:prstGeom prst="rect">
+            <a:avLst/>
+          </a:prstGeom>
+          <a:noFill/>
+        </p:spPr>
+      </p:pic>
+      <p:sp>
+        <p:nvSpPr>
+          <p:cNvPr id="1058" name="Rectangle 34"/>
+          <p:cNvSpPr>
+            <a:spLocks noChangeArrowheads="1"/>
+          </p:cNvSpPr>
+          <p:nvPr/>
+        </p:nvSpPr>
+        <p:spPr bwMode="auto">
+          <a:xfrm>
+            <a:off x="0" y="866775"/>
+            <a:ext cx="9144000" cy="0"/>
+          </a:xfrm>
+          <a:prstGeom prst="rect">
+            <a:avLst/>
+          </a:prstGeom>
+          <a:noFill/>
+          <a:ln w="9525">
+            <a:noFill/>
+            <a:miter lim="800000"/>
+            <a:headEnd/>
+            <a:tailEnd/>
+          </a:ln>
+          <a:effectLst/>
+        </p:spPr>
+        <p:txBody>
+          <a:bodyPr vert="horz" wrap="none" lIns="91440" tIns="45720" rIns="91440" bIns="45720" numCol="1" anchor="ctr" anchorCtr="0" compatLnSpc="1">
+            <a:prstTxWarp prst="textNoShape">
+              <a:avLst/>
+            </a:prstTxWarp>
+            <a:spAutoFit/>
+          </a:bodyPr>
+          <a:lstStyle/>
+          <a:p>
+            <a:pPr marL="0" marR="0" lvl="0" indent="0" algn="l" defTabSz="914400" rtl="0" eaLnBrk="1" fontAlgn="base" latinLnBrk="0" hangingPunct="1">
+              <a:lnSpc>
+                <a:spcPct val="100000"/>
+              </a:lnSpc>
+              <a:spcBef>
+                <a:spcPct val="0"/>
+              </a:spcBef>
+              <a:spcAft>
+                <a:spcPct val="0"/>
+              </a:spcAft>
+              <a:buClrTx/>
+              <a:buSzTx/>
+              <a:buFontTx/>
+              <a:buNone/>
+              <a:tabLst/>
+            </a:pPr>
+            <a:endParaRPr kumimoji="0" lang="sv-SE" sz="1800" b="0" i="0" u="none" strike="noStrike" cap="none" normalizeH="0" baseline="0" smtClean="0">
+              <a:ln>
+                <a:noFill/>
+              </a:ln>
+              <a:solidFill>
+                <a:schemeClr val="tx1"/>
+              </a:solidFill>
+              <a:effectLst/>
+              <a:latin typeface="Arial" pitchFamily="34" charset="0"/>
+              <a:cs typeface="Arial" pitchFamily="34" charset="0"/>
+            </a:endParaRPr>
+          </a:p>
+        </p:txBody>
+      </p:sp>
+    </p:spTree>
+  </p:cSld>
+  <p:clrMapOvr>
+    <a:masterClrMapping/>
+  </p:clrMapOvr>
+</p:sld>
+</file>
+
 <file path=ppt/slides/slide2.xml><?xml version="1.0" encoding="utf-8"?>
 <p:sld xmlns:a="http://schemas.openxmlformats.org/drawingml/2006/main" xmlns:r="http://schemas.openxmlformats.org/officeDocument/2006/relationships" xmlns:p="http://schemas.openxmlformats.org/presentationml/2006/main">
   <p:cSld>
@@ -10081,11 +11485,7 @@
             <a:pPr algn="ctr"/>
             <a:r>
               <a:rPr lang="sv-SE" dirty="0" smtClean="0"/>
-              <a:t>Encoder</a:t>
-            </a:r>
-            <a:r>
-              <a:rPr lang="sv-SE" dirty="0" smtClean="0"/>
-              <a:t> Block</a:t>
+              <a:t>Encoder Block</a:t>
             </a:r>
             <a:endParaRPr lang="sv-SE" dirty="0"/>
           </a:p>
@@ -10129,11 +11529,7 @@
             <a:pPr algn="ctr"/>
             <a:r>
               <a:rPr lang="sv-SE" dirty="0" smtClean="0"/>
-              <a:t>Encoder</a:t>
-            </a:r>
-            <a:r>
-              <a:rPr lang="sv-SE" dirty="0" smtClean="0"/>
-              <a:t> Block</a:t>
+              <a:t>Encoder Block</a:t>
             </a:r>
             <a:endParaRPr lang="sv-SE" dirty="0"/>
           </a:p>
@@ -10221,15 +11617,7 @@
             <a:pPr algn="ctr"/>
             <a:r>
               <a:rPr lang="sv-SE" dirty="0" smtClean="0"/>
-              <a:t>De</a:t>
-            </a:r>
-            <a:r>
-              <a:rPr lang="sv-SE" dirty="0" smtClean="0"/>
-              <a:t>coder</a:t>
-            </a:r>
-            <a:r>
-              <a:rPr lang="sv-SE" dirty="0" smtClean="0"/>
-              <a:t> Block</a:t>
+              <a:t>Decoder Block</a:t>
             </a:r>
             <a:endParaRPr lang="sv-SE" dirty="0"/>
           </a:p>
@@ -10273,15 +11661,7 @@
             <a:pPr algn="ctr"/>
             <a:r>
               <a:rPr lang="sv-SE" dirty="0" smtClean="0"/>
-              <a:t>De</a:t>
-            </a:r>
-            <a:r>
-              <a:rPr lang="sv-SE" dirty="0" smtClean="0"/>
-              <a:t>coder</a:t>
-            </a:r>
-            <a:r>
-              <a:rPr lang="sv-SE" dirty="0" smtClean="0"/>
-              <a:t> Block</a:t>
+              <a:t>Decoder Block</a:t>
             </a:r>
             <a:endParaRPr lang="sv-SE" dirty="0"/>
           </a:p>
@@ -12276,7 +13656,6 @@
               <a:rPr lang="sv-SE" dirty="0" smtClean="0"/>
               <a:t>fox</a:t>
             </a:r>
-            <a:endParaRPr lang="sv-SE" dirty="0" smtClean="0"/>
           </a:p>
           <a:p>
             <a:r>
@@ -16528,11 +17907,7 @@
             <a:pPr algn="ctr"/>
             <a:r>
               <a:rPr lang="sv-SE" dirty="0" smtClean="0"/>
-              <a:t>Linear</a:t>
-            </a:r>
-            <a:r>
-              <a:rPr lang="sv-SE" dirty="0" smtClean="0"/>
-              <a:t> </a:t>
+              <a:t>Linear </a:t>
             </a:r>
             <a:r>
               <a:rPr lang="en-US" dirty="0" smtClean="0"/>
@@ -16901,11 +18276,7 @@
           <a:p>
             <a:r>
               <a:rPr lang="sv-SE" dirty="0" smtClean="0"/>
-              <a:t>Input </a:t>
-            </a:r>
-            <a:r>
-              <a:rPr lang="sv-SE" dirty="0" smtClean="0"/>
-              <a:t>Embedder</a:t>
+              <a:t>Input Embedder</a:t>
             </a:r>
             <a:endParaRPr lang="sv-SE" dirty="0"/>
           </a:p>
@@ -19022,11 +20393,7 @@
             <a:pPr algn="ctr"/>
             <a:r>
               <a:rPr lang="sv-SE" dirty="0" smtClean="0"/>
-              <a:t>U-net</a:t>
-            </a:r>
-            <a:r>
-              <a:rPr lang="sv-SE" dirty="0" smtClean="0"/>
-              <a:t> </a:t>
+              <a:t>U-net </a:t>
             </a:r>
             <a:endParaRPr lang="sv-SE" dirty="0"/>
           </a:p>

</xml_diff>